<commit_message>
add slide Github files
</commit_message>
<xml_diff>
--- a/SSHTGithub.pptx
+++ b/SSHTGithub.pptx
@@ -5,7 +5,7 @@
     <p:sldMasterId id="2147483660" r:id="rId1"/>
   </p:sldMasterIdLst>
   <p:notesMasterIdLst>
-    <p:notesMasterId r:id="rId14"/>
+    <p:notesMasterId r:id="rId15"/>
   </p:notesMasterIdLst>
   <p:sldIdLst>
     <p:sldId id="259" r:id="rId2"/>
@@ -16,10 +16,11 @@
     <p:sldId id="265" r:id="rId7"/>
     <p:sldId id="266" r:id="rId8"/>
     <p:sldId id="272" r:id="rId9"/>
-    <p:sldId id="271" r:id="rId10"/>
-    <p:sldId id="268" r:id="rId11"/>
-    <p:sldId id="273" r:id="rId12"/>
-    <p:sldId id="264" r:id="rId13"/>
+    <p:sldId id="274" r:id="rId10"/>
+    <p:sldId id="271" r:id="rId11"/>
+    <p:sldId id="268" r:id="rId12"/>
+    <p:sldId id="273" r:id="rId13"/>
+    <p:sldId id="264" r:id="rId14"/>
   </p:sldIdLst>
   <p:sldSz cx="17338675" cy="9753600"/>
   <p:notesSz cx="6858000" cy="9144000"/>
@@ -219,7 +220,7 @@
           <a:p>
             <a:fld id="{86680C0C-85DF-417F-8238-DB0D15743621}" type="datetimeFigureOut">
               <a:rPr lang="en-GB" smtClean="0"/>
-              <a:t>22/02/2021</a:t>
+              <a:t>24/02/2021</a:t>
             </a:fld>
             <a:endParaRPr lang="en-GB"/>
           </a:p>
@@ -689,7 +690,7 @@
           <a:p>
             <a:fld id="{50464F84-246C-4657-8172-1E2969D0F603}" type="datetime1">
               <a:rPr lang="en-GB" smtClean="0"/>
-              <a:t>22/02/2021</a:t>
+              <a:t>24/02/2021</a:t>
             </a:fld>
             <a:endParaRPr lang="en-GB"/>
           </a:p>
@@ -1629,7 +1630,7 @@
           <a:p>
             <a:fld id="{4FCCCAF6-1686-4743-9124-83F33F1A0EA9}" type="datetime1">
               <a:rPr lang="en-GB" noProof="0" smtClean="0"/>
-              <a:t>22/02/2021</a:t>
+              <a:t>24/02/2021</a:t>
             </a:fld>
             <a:endParaRPr lang="en-GB" noProof="0" dirty="0"/>
           </a:p>
@@ -1747,7 +1748,7 @@
           <a:p>
             <a:fld id="{B86ADBF0-A618-4E69-83BB-0C41E08702AA}" type="datetime1">
               <a:rPr lang="en-GB" noProof="0" smtClean="0"/>
-              <a:t>22/02/2021</a:t>
+              <a:t>24/02/2021</a:t>
             </a:fld>
             <a:endParaRPr lang="en-GB" noProof="0" dirty="0"/>
           </a:p>
@@ -2007,7 +2008,7 @@
           <a:p>
             <a:fld id="{F2443E58-CDC3-4782-B82C-4D381C795B98}" type="datetime1">
               <a:rPr lang="en-GB" noProof="0" smtClean="0"/>
-              <a:t>22/02/2021</a:t>
+              <a:t>24/02/2021</a:t>
             </a:fld>
             <a:endParaRPr lang="en-GB" noProof="0" dirty="0"/>
           </a:p>
@@ -2147,7 +2148,7 @@
           <a:p>
             <a:fld id="{3D3465D1-804F-429B-83CD-3EFA8410E123}" type="datetime1">
               <a:rPr lang="en-GB" smtClean="0"/>
-              <a:t>22/02/2021</a:t>
+              <a:t>24/02/2021</a:t>
             </a:fld>
             <a:endParaRPr lang="en-GB"/>
           </a:p>
@@ -2663,7 +2664,7 @@
           <a:p>
             <a:fld id="{434BA3CA-1064-434F-B179-AB3B0298C0D6}" type="datetime1">
               <a:rPr lang="en-GB" noProof="0" smtClean="0"/>
-              <a:t>22/02/2021</a:t>
+              <a:t>24/02/2021</a:t>
             </a:fld>
             <a:endParaRPr lang="en-GB" noProof="0" dirty="0"/>
           </a:p>
@@ -3366,6 +3367,145 @@
           <p:cNvPr id="2" name="Titel 1">
             <a:extLst>
               <a:ext uri="{FF2B5EF4-FFF2-40B4-BE49-F238E27FC236}">
+                <a16:creationId xmlns:a16="http://schemas.microsoft.com/office/drawing/2014/main" id="{08CCC904-6B2D-AD4A-A733-C99AD515F380}"/>
+              </a:ext>
+            </a:extLst>
+          </p:cNvPr>
+          <p:cNvSpPr>
+            <a:spLocks noGrp="1"/>
+          </p:cNvSpPr>
+          <p:nvPr>
+            <p:ph type="title"/>
+          </p:nvPr>
+        </p:nvSpPr>
+        <p:spPr/>
+        <p:txBody>
+          <a:bodyPr/>
+          <a:lstStyle/>
+          <a:p>
+            <a:r>
+              <a:rPr lang="nl-BE" dirty="0"/>
+              <a:t>Github.com</a:t>
+            </a:r>
+          </a:p>
+        </p:txBody>
+      </p:sp>
+      <p:sp>
+        <p:nvSpPr>
+          <p:cNvPr id="3" name="Tijdelijke aanduiding voor inhoud 2">
+            <a:extLst>
+              <a:ext uri="{FF2B5EF4-FFF2-40B4-BE49-F238E27FC236}">
+                <a16:creationId xmlns:a16="http://schemas.microsoft.com/office/drawing/2014/main" id="{BD340E00-5B7D-0F41-BFBF-8E6E470E7F67}"/>
+              </a:ext>
+            </a:extLst>
+          </p:cNvPr>
+          <p:cNvSpPr>
+            <a:spLocks noGrp="1"/>
+          </p:cNvSpPr>
+          <p:nvPr>
+            <p:ph idx="1"/>
+          </p:nvPr>
+        </p:nvSpPr>
+        <p:spPr/>
+        <p:txBody>
+          <a:bodyPr/>
+          <a:lstStyle/>
+          <a:p>
+            <a:r>
+              <a:rPr lang="nl-BE" dirty="0"/>
+              <a:t>User</a:t>
+            </a:r>
+          </a:p>
+          <a:p>
+            <a:r>
+              <a:rPr lang="nl-BE" dirty="0"/>
+              <a:t>Organisation</a:t>
+            </a:r>
+          </a:p>
+          <a:p>
+            <a:r>
+              <a:rPr lang="nl-BE" dirty="0"/>
+              <a:t>Project is place to track issues, features and tasks related to repositories</a:t>
+            </a:r>
+          </a:p>
+          <a:p>
+            <a:r>
+              <a:rPr lang="nl-BE" dirty="0"/>
+              <a:t>GitHub Issues to track ideas, enhancements, tasks, or bugs for work on GitHub</a:t>
+            </a:r>
+          </a:p>
+          <a:p>
+            <a:r>
+              <a:rPr lang="nl-BE" dirty="0"/>
+              <a:t>GitHub Enterprise: github.ugent.be</a:t>
+            </a:r>
+          </a:p>
+        </p:txBody>
+      </p:sp>
+      <p:sp>
+        <p:nvSpPr>
+          <p:cNvPr id="4" name="Tijdelijke aanduiding voor dianummer 3">
+            <a:extLst>
+              <a:ext uri="{FF2B5EF4-FFF2-40B4-BE49-F238E27FC236}">
+                <a16:creationId xmlns:a16="http://schemas.microsoft.com/office/drawing/2014/main" id="{8CF3EA43-2A07-CB48-8B2C-A8F92EEB45DD}"/>
+              </a:ext>
+            </a:extLst>
+          </p:cNvPr>
+          <p:cNvSpPr>
+            <a:spLocks noGrp="1"/>
+          </p:cNvSpPr>
+          <p:nvPr>
+            <p:ph type="sldNum" sz="quarter" idx="12"/>
+          </p:nvPr>
+        </p:nvSpPr>
+        <p:spPr/>
+        <p:txBody>
+          <a:bodyPr/>
+          <a:lstStyle/>
+          <a:p>
+            <a:fld id="{7AE184E0-0BD4-4705-A12B-9B71DDE63301}" type="slidenum">
+              <a:rPr lang="en-GB" noProof="0" smtClean="0"/>
+              <a:t>10</a:t>
+            </a:fld>
+            <a:endParaRPr lang="en-GB" noProof="0" dirty="0"/>
+          </a:p>
+        </p:txBody>
+      </p:sp>
+    </p:spTree>
+    <p:extLst>
+      <p:ext uri="{BB962C8B-B14F-4D97-AF65-F5344CB8AC3E}">
+        <p14:creationId xmlns:p14="http://schemas.microsoft.com/office/powerpoint/2010/main" val="2917736863"/>
+      </p:ext>
+    </p:extLst>
+  </p:cSld>
+  <p:clrMapOvr>
+    <a:masterClrMapping/>
+  </p:clrMapOvr>
+</p:sld>
+</file>
+
+<file path=ppt/slides/slide11.xml><?xml version="1.0" encoding="utf-8"?>
+<p:sld xmlns:a="http://schemas.openxmlformats.org/drawingml/2006/main" xmlns:r="http://schemas.openxmlformats.org/officeDocument/2006/relationships" xmlns:p="http://schemas.openxmlformats.org/presentationml/2006/main">
+  <p:cSld>
+    <p:spTree>
+      <p:nvGrpSpPr>
+        <p:cNvPr id="1" name=""/>
+        <p:cNvGrpSpPr/>
+        <p:nvPr/>
+      </p:nvGrpSpPr>
+      <p:grpSpPr>
+        <a:xfrm>
+          <a:off x="0" y="0"/>
+          <a:ext cx="0" cy="0"/>
+          <a:chOff x="0" y="0"/>
+          <a:chExt cx="0" cy="0"/>
+        </a:xfrm>
+      </p:grpSpPr>
+      <p:sp>
+        <p:nvSpPr>
+          <p:cNvPr id="2" name="Titel 1">
+            <a:extLst>
+              <a:ext uri="{FF2B5EF4-FFF2-40B4-BE49-F238E27FC236}">
                 <a16:creationId xmlns:a16="http://schemas.microsoft.com/office/drawing/2014/main" id="{4634A112-F187-5B4B-8142-757B7980FAA9}"/>
               </a:ext>
             </a:extLst>
@@ -3477,7 +3617,7 @@
           <a:p>
             <a:fld id="{7AE184E0-0BD4-4705-A12B-9B71DDE63301}" type="slidenum">
               <a:rPr lang="en-GB" noProof="0" smtClean="0"/>
-              <a:t>10</a:t>
+              <a:t>11</a:t>
             </a:fld>
             <a:endParaRPr lang="en-GB" noProof="0" dirty="0"/>
           </a:p>
@@ -3541,7 +3681,7 @@
 </p:sld>
 </file>
 
-<file path=ppt/slides/slide11.xml><?xml version="1.0" encoding="utf-8"?>
+<file path=ppt/slides/slide12.xml><?xml version="1.0" encoding="utf-8"?>
 <p:sld xmlns:a="http://schemas.openxmlformats.org/drawingml/2006/main" xmlns:r="http://schemas.openxmlformats.org/officeDocument/2006/relationships" xmlns:p="http://schemas.openxmlformats.org/presentationml/2006/main">
   <p:cSld>
     <p:spTree>
@@ -3649,7 +3789,7 @@
           <a:p>
             <a:fld id="{7AE184E0-0BD4-4705-A12B-9B71DDE63301}" type="slidenum">
               <a:rPr lang="en-GB" noProof="0" smtClean="0"/>
-              <a:t>11</a:t>
+              <a:t>12</a:t>
             </a:fld>
             <a:endParaRPr lang="en-GB" noProof="0" dirty="0"/>
           </a:p>
@@ -3668,7 +3808,7 @@
 </p:sld>
 </file>
 
-<file path=ppt/slides/slide12.xml><?xml version="1.0" encoding="utf-8"?>
+<file path=ppt/slides/slide13.xml><?xml version="1.0" encoding="utf-8"?>
 <p:sld xmlns:a="http://schemas.openxmlformats.org/drawingml/2006/main" xmlns:r="http://schemas.openxmlformats.org/officeDocument/2006/relationships" xmlns:p="http://schemas.openxmlformats.org/presentationml/2006/main">
   <p:cSld>
     <p:spTree>
@@ -3896,7 +4036,7 @@
           <a:p>
             <a:r>
               <a:rPr lang="nl-NL" dirty="0"/>
-              <a:t>SSHHT </a:t>
+              <a:t>SSHT </a:t>
             </a:r>
             <a:r>
               <a:rPr lang="nl-NL" dirty="0" err="1"/>
@@ -4786,7 +4926,7 @@
           <a:p>
             <a:r>
               <a:rPr lang="nl-BE" dirty="0"/>
-              <a:t>GitHUB PyCharm demo</a:t>
+              <a:t>GitHUB R-Studio demo</a:t>
             </a:r>
           </a:p>
         </p:txBody>
@@ -4880,7 +5020,7 @@
           <p:cNvPr id="2" name="Titel 1">
             <a:extLst>
               <a:ext uri="{FF2B5EF4-FFF2-40B4-BE49-F238E27FC236}">
-                <a16:creationId xmlns:a16="http://schemas.microsoft.com/office/drawing/2014/main" id="{08CCC904-6B2D-AD4A-A733-C99AD515F380}"/>
+                <a16:creationId xmlns:a16="http://schemas.microsoft.com/office/drawing/2014/main" id="{32060708-FF54-0D4A-B2A1-25943C0C6FB1}"/>
               </a:ext>
             </a:extLst>
           </p:cNvPr>
@@ -4898,7 +5038,7 @@
           <a:p>
             <a:r>
               <a:rPr lang="nl-BE" dirty="0"/>
-              <a:t>Github.com</a:t>
+              <a:t>Github special files</a:t>
             </a:r>
           </a:p>
         </p:txBody>
@@ -4908,7 +5048,7 @@
           <p:cNvPr id="3" name="Tijdelijke aanduiding voor inhoud 2">
             <a:extLst>
               <a:ext uri="{FF2B5EF4-FFF2-40B4-BE49-F238E27FC236}">
-                <a16:creationId xmlns:a16="http://schemas.microsoft.com/office/drawing/2014/main" id="{BD340E00-5B7D-0F41-BFBF-8E6E470E7F67}"/>
+                <a16:creationId xmlns:a16="http://schemas.microsoft.com/office/drawing/2014/main" id="{866BFDE6-29B3-AF43-8B87-5D20EF4AD9A1}"/>
               </a:ext>
             </a:extLst>
           </p:cNvPr>
@@ -4926,32 +5066,17 @@
           <a:p>
             <a:r>
               <a:rPr lang="nl-BE" dirty="0"/>
-              <a:t>User</a:t>
-            </a:r>
-          </a:p>
-          <a:p>
-            <a:r>
-              <a:rPr lang="nl-BE" dirty="0"/>
-              <a:t>Organisation</a:t>
-            </a:r>
-          </a:p>
-          <a:p>
-            <a:r>
-              <a:rPr lang="nl-BE" dirty="0"/>
-              <a:t>Project is place to track issues, features and tasks related to repositories</a:t>
-            </a:r>
-          </a:p>
-          <a:p>
-            <a:r>
-              <a:rPr lang="nl-BE" dirty="0"/>
-              <a:t>GitHub Issues to track ideas, enhancements, tasks, or bugs for work on GitHub</a:t>
-            </a:r>
-          </a:p>
-          <a:p>
-            <a:r>
-              <a:rPr lang="nl-BE" dirty="0"/>
-              <a:t>GitHub Enterprise: github.ugent.be</a:t>
-            </a:r>
+              <a:t>README.md</a:t>
+            </a:r>
+          </a:p>
+          <a:p>
+            <a:r>
+              <a:rPr lang="nl-BE"/>
+              <a:t>.GIT directory: meta-data about repository</a:t>
+            </a:r>
+          </a:p>
+          <a:p>
+            <a:endParaRPr lang="nl-BE"/>
           </a:p>
         </p:txBody>
       </p:sp>
@@ -4960,7 +5085,7 @@
           <p:cNvPr id="4" name="Tijdelijke aanduiding voor dianummer 3">
             <a:extLst>
               <a:ext uri="{FF2B5EF4-FFF2-40B4-BE49-F238E27FC236}">
-                <a16:creationId xmlns:a16="http://schemas.microsoft.com/office/drawing/2014/main" id="{8CF3EA43-2A07-CB48-8B2C-A8F92EEB45DD}"/>
+                <a16:creationId xmlns:a16="http://schemas.microsoft.com/office/drawing/2014/main" id="{237522ED-E2DA-B642-8596-90974693E764}"/>
               </a:ext>
             </a:extLst>
           </p:cNvPr>
@@ -4987,7 +5112,7 @@
     </p:spTree>
     <p:extLst>
       <p:ext uri="{BB962C8B-B14F-4D97-AF65-F5344CB8AC3E}">
-        <p14:creationId xmlns:p14="http://schemas.microsoft.com/office/powerpoint/2010/main" val="2917736863"/>
+        <p14:creationId xmlns:p14="http://schemas.microsoft.com/office/powerpoint/2010/main" val="4141959002"/>
       </p:ext>
     </p:extLst>
   </p:cSld>

</xml_diff>